<commit_message>
added title slide in presentation
</commit_message>
<xml_diff>
--- a/presentations/Research_Project_Presentation.pptx
+++ b/presentations/Research_Project_Presentation.pptx
@@ -5,7 +5,8 @@
     <p:sldMasterId id="2147483660" r:id="rId1"/>
   </p:sldMasterIdLst>
   <p:sldIdLst>
-    <p:sldId id="256" r:id="rId2"/>
+    <p:sldId id="257" r:id="rId2"/>
+    <p:sldId id="256" r:id="rId3"/>
   </p:sldIdLst>
   <p:sldSz cx="12192000" cy="6858000"/>
   <p:notesSz cx="6858000" cy="9144000"/>
@@ -109,6 +110,7 @@
       <p14:sectionLst xmlns:p14="http://schemas.microsoft.com/office/powerpoint/2010/main">
         <p14:section name="Default Section" id="{45F6472C-3E8A-44DA-A4CE-058F27246A92}">
           <p14:sldIdLst>
+            <p14:sldId id="257"/>
             <p14:sldId id="256"/>
           </p14:sldIdLst>
         </p14:section>
@@ -20613,6 +20615,97 @@
       </p:grpSpPr>
       <p:sp>
         <p:nvSpPr>
+          <p:cNvPr id="7" name="Title 6">
+            <a:extLst>
+              <a:ext uri="{FF2B5EF4-FFF2-40B4-BE49-F238E27FC236}">
+                <a16:creationId xmlns:a16="http://schemas.microsoft.com/office/drawing/2014/main" id="{AE20C860-EAE4-5AC2-7DD4-A6B2F26D6A6A}"/>
+              </a:ext>
+            </a:extLst>
+          </p:cNvPr>
+          <p:cNvSpPr>
+            <a:spLocks noGrp="1"/>
+          </p:cNvSpPr>
+          <p:nvPr>
+            <p:ph type="title"/>
+          </p:nvPr>
+        </p:nvSpPr>
+        <p:spPr>
+          <a:xfrm>
+            <a:off x="1024128" y="585216"/>
+            <a:ext cx="9720072" cy="4210304"/>
+          </a:xfrm>
+        </p:spPr>
+        <p:txBody>
+          <a:bodyPr>
+            <a:normAutofit fontScale="90000"/>
+          </a:bodyPr>
+          <a:lstStyle/>
+          <a:p>
+            <a:r>
+              <a:rPr lang="en-US" dirty="0"/>
+              <a:t>Performance Analysis of LR and SVM models for diabetes prediction</a:t>
+            </a:r>
+            <a:br>
+              <a:rPr lang="en-US" dirty="0"/>
+            </a:br>
+            <a:br>
+              <a:rPr lang="en-US" dirty="0"/>
+            </a:br>
+            <a:br>
+              <a:rPr lang="en-US" dirty="0"/>
+            </a:br>
+            <a:br>
+              <a:rPr lang="en-US" dirty="0"/>
+            </a:br>
+            <a:br>
+              <a:rPr lang="en-US" dirty="0"/>
+            </a:br>
+            <a:r>
+              <a:rPr lang="en-US" sz="2200" dirty="0"/>
+              <a:t>Presented by</a:t>
+            </a:r>
+            <a:br>
+              <a:rPr lang="en-US" sz="2200" dirty="0"/>
+            </a:br>
+            <a:r>
+              <a:rPr lang="en-US" sz="2200" dirty="0"/>
+              <a:t>Vyshnavi sanikommu</a:t>
+            </a:r>
+          </a:p>
+        </p:txBody>
+      </p:sp>
+    </p:spTree>
+    <p:extLst>
+      <p:ext uri="{BB962C8B-B14F-4D97-AF65-F5344CB8AC3E}">
+        <p14:creationId xmlns:p14="http://schemas.microsoft.com/office/powerpoint/2010/main" val="2771330573"/>
+      </p:ext>
+    </p:extLst>
+  </p:cSld>
+  <p:clrMapOvr>
+    <a:masterClrMapping/>
+  </p:clrMapOvr>
+</p:sld>
+</file>
+
+<file path=ppt/slides/slide2.xml><?xml version="1.0" encoding="utf-8"?>
+<p:sld xmlns:a="http://schemas.openxmlformats.org/drawingml/2006/main" xmlns:r="http://schemas.openxmlformats.org/officeDocument/2006/relationships" xmlns:p="http://schemas.openxmlformats.org/presentationml/2006/main">
+  <p:cSld>
+    <p:spTree>
+      <p:nvGrpSpPr>
+        <p:cNvPr id="1" name=""/>
+        <p:cNvGrpSpPr/>
+        <p:nvPr/>
+      </p:nvGrpSpPr>
+      <p:grpSpPr>
+        <a:xfrm>
+          <a:off x="0" y="0"/>
+          <a:ext cx="0" cy="0"/>
+          <a:chOff x="0" y="0"/>
+          <a:chExt cx="0" cy="0"/>
+        </a:xfrm>
+      </p:grpSpPr>
+      <p:sp>
+        <p:nvSpPr>
           <p:cNvPr id="2" name="Title 1">
             <a:extLst>
               <a:ext uri="{FF2B5EF4-FFF2-40B4-BE49-F238E27FC236}">

</xml_diff>